<commit_message>
Add changes to questions
</commit_message>
<xml_diff>
--- a/SVM/Coding_Exercise_and_Solutions.pptx
+++ b/SVM/Coding_Exercise_and_Solutions.pptx
@@ -112,6 +112,11 @@
       </a:defRPr>
     </a:lvl9pPr>
   </p:defaultTextStyle>
+  <p:extLst>
+    <p:ext uri="{EFAFB233-063F-42B5-8137-9DF3F51BA10A}">
+      <p15:sldGuideLst xmlns:p15="http://schemas.microsoft.com/office/powerpoint/2012/main"/>
+    </p:ext>
+  </p:extLst>
 </p:presentation>
 </file>
 
@@ -262,7 +267,7 @@
           <a:p>
             <a:fld id="{0A7D3994-55C8-4C87-8E73-EFE8E8BA4561}" type="datetimeFigureOut">
               <a:rPr lang="en-US" smtClean="0"/>
-              <a:t>5/27/2023</a:t>
+              <a:t>5/28/2023</a:t>
             </a:fld>
             <a:endParaRPr lang="en-US"/>
           </a:p>
@@ -460,7 +465,7 @@
           <a:p>
             <a:fld id="{0A7D3994-55C8-4C87-8E73-EFE8E8BA4561}" type="datetimeFigureOut">
               <a:rPr lang="en-US" smtClean="0"/>
-              <a:t>5/27/2023</a:t>
+              <a:t>5/28/2023</a:t>
             </a:fld>
             <a:endParaRPr lang="en-US"/>
           </a:p>
@@ -668,7 +673,7 @@
           <a:p>
             <a:fld id="{0A7D3994-55C8-4C87-8E73-EFE8E8BA4561}" type="datetimeFigureOut">
               <a:rPr lang="en-US" smtClean="0"/>
-              <a:t>5/27/2023</a:t>
+              <a:t>5/28/2023</a:t>
             </a:fld>
             <a:endParaRPr lang="en-US"/>
           </a:p>
@@ -866,7 +871,7 @@
           <a:p>
             <a:fld id="{0A7D3994-55C8-4C87-8E73-EFE8E8BA4561}" type="datetimeFigureOut">
               <a:rPr lang="en-US" smtClean="0"/>
-              <a:t>5/27/2023</a:t>
+              <a:t>5/28/2023</a:t>
             </a:fld>
             <a:endParaRPr lang="en-US"/>
           </a:p>
@@ -1141,7 +1146,7 @@
           <a:p>
             <a:fld id="{0A7D3994-55C8-4C87-8E73-EFE8E8BA4561}" type="datetimeFigureOut">
               <a:rPr lang="en-US" smtClean="0"/>
-              <a:t>5/27/2023</a:t>
+              <a:t>5/28/2023</a:t>
             </a:fld>
             <a:endParaRPr lang="en-US"/>
           </a:p>
@@ -1406,7 +1411,7 @@
           <a:p>
             <a:fld id="{0A7D3994-55C8-4C87-8E73-EFE8E8BA4561}" type="datetimeFigureOut">
               <a:rPr lang="en-US" smtClean="0"/>
-              <a:t>5/27/2023</a:t>
+              <a:t>5/28/2023</a:t>
             </a:fld>
             <a:endParaRPr lang="en-US"/>
           </a:p>
@@ -1818,7 +1823,7 @@
           <a:p>
             <a:fld id="{0A7D3994-55C8-4C87-8E73-EFE8E8BA4561}" type="datetimeFigureOut">
               <a:rPr lang="en-US" smtClean="0"/>
-              <a:t>5/27/2023</a:t>
+              <a:t>5/28/2023</a:t>
             </a:fld>
             <a:endParaRPr lang="en-US"/>
           </a:p>
@@ -1959,7 +1964,7 @@
           <a:p>
             <a:fld id="{0A7D3994-55C8-4C87-8E73-EFE8E8BA4561}" type="datetimeFigureOut">
               <a:rPr lang="en-US" smtClean="0"/>
-              <a:t>5/27/2023</a:t>
+              <a:t>5/28/2023</a:t>
             </a:fld>
             <a:endParaRPr lang="en-US"/>
           </a:p>
@@ -2072,7 +2077,7 @@
           <a:p>
             <a:fld id="{0A7D3994-55C8-4C87-8E73-EFE8E8BA4561}" type="datetimeFigureOut">
               <a:rPr lang="en-US" smtClean="0"/>
-              <a:t>5/27/2023</a:t>
+              <a:t>5/28/2023</a:t>
             </a:fld>
             <a:endParaRPr lang="en-US"/>
           </a:p>
@@ -2383,7 +2388,7 @@
           <a:p>
             <a:fld id="{0A7D3994-55C8-4C87-8E73-EFE8E8BA4561}" type="datetimeFigureOut">
               <a:rPr lang="en-US" smtClean="0"/>
-              <a:t>5/27/2023</a:t>
+              <a:t>5/28/2023</a:t>
             </a:fld>
             <a:endParaRPr lang="en-US"/>
           </a:p>
@@ -2671,7 +2676,7 @@
           <a:p>
             <a:fld id="{0A7D3994-55C8-4C87-8E73-EFE8E8BA4561}" type="datetimeFigureOut">
               <a:rPr lang="en-US" smtClean="0"/>
-              <a:t>5/27/2023</a:t>
+              <a:t>5/28/2023</a:t>
             </a:fld>
             <a:endParaRPr lang="en-US"/>
           </a:p>
@@ -2912,7 +2917,7 @@
           <a:p>
             <a:fld id="{0A7D3994-55C8-4C87-8E73-EFE8E8BA4561}" type="datetimeFigureOut">
               <a:rPr lang="en-US" smtClean="0"/>
-              <a:t>5/27/2023</a:t>
+              <a:t>5/28/2023</a:t>
             </a:fld>
             <a:endParaRPr lang="en-US"/>
           </a:p>
@@ -3598,8 +3603,8 @@
         </p:nvSpPr>
         <p:spPr>
           <a:xfrm>
-            <a:off x="223343" y="663997"/>
-            <a:ext cx="11886771" cy="6194003"/>
+            <a:off x="232441" y="798879"/>
+            <a:ext cx="11886771" cy="5740033"/>
           </a:xfrm>
           <a:prstGeom prst="rect">
             <a:avLst/>
@@ -3613,35 +3618,35 @@
           <a:lstStyle/>
           <a:p>
             <a:r>
-              <a:rPr lang="en-US" sz="1600" dirty="0"/>
+              <a:rPr lang="en-US" sz="1400" dirty="0"/>
               <a:t>SVM does not support multiclass classification natively. Two commonly used approaches that extend SVM for </a:t>
             </a:r>
             <a:br>
-              <a:rPr lang="en-US" sz="1600" dirty="0"/>
+              <a:rPr lang="en-US" sz="1400" dirty="0"/>
             </a:br>
             <a:r>
-              <a:rPr lang="en-US" sz="1600" dirty="0"/>
+              <a:rPr lang="en-US" sz="1400" dirty="0"/>
               <a:t> multiclass classification are 1) One-vs-One and 2) One-vs-Rest. </a:t>
             </a:r>
             <a:br>
-              <a:rPr lang="en-US" sz="1600" dirty="0"/>
+              <a:rPr lang="en-US" sz="1400" dirty="0"/>
             </a:br>
             <a:br>
-              <a:rPr lang="en-US" sz="500" dirty="0"/>
+              <a:rPr lang="en-US" sz="400" dirty="0"/>
             </a:br>
             <a:r>
-              <a:rPr lang="en-US" sz="1600" dirty="0"/>
+              <a:rPr lang="en-US" sz="1400" dirty="0"/>
               <a:t>In this exercise, we would like you to apply multiclass classification using SVM to classify number 0-10 from MNIST dataset. </a:t>
             </a:r>
           </a:p>
           <a:p>
             <a:r>
-              <a:rPr lang="en-US" sz="1600" dirty="0"/>
+              <a:rPr lang="en-US" sz="1400" dirty="0"/>
               <a:t> Specifically, we would like you to explore the following: </a:t>
             </a:r>
           </a:p>
           <a:p>
-            <a:endParaRPr lang="en-US" sz="1600" dirty="0"/>
+            <a:endParaRPr lang="en-US" sz="1400" dirty="0"/>
           </a:p>
           <a:p>
             <a:pPr marL="342900" indent="-342900">
@@ -3649,7 +3654,7 @@
               <a:buAutoNum type="arabicPeriod"/>
             </a:pPr>
             <a:r>
-              <a:rPr lang="en-US" sz="1600" dirty="0"/>
+              <a:rPr lang="en-US" sz="1400" dirty="0"/>
               <a:t>MNIST contains around 60,000 samples for training and 10,000 for testing (which can be too large for some computing units). </a:t>
             </a:r>
           </a:p>
@@ -3662,11 +3667,11 @@
               <a:buAutoNum type="alphaLcParenR"/>
             </a:pPr>
             <a:r>
-              <a:rPr lang="en-US" sz="1600" dirty="0"/>
+              <a:rPr lang="en-US" sz="1400" dirty="0"/>
               <a:t>You may randomly select 6000 samples for training and 1000 sample for testing. Ensure that you have chosen the samples evenly from each class. </a:t>
             </a:r>
             <a:r>
-              <a:rPr lang="en-US" sz="1600" b="0" i="0" dirty="0">
+              <a:rPr lang="en-US" sz="1400" b="0" i="0" dirty="0">
                 <a:solidFill>
                   <a:srgbClr val="374151"/>
                 </a:solidFill>
@@ -3675,14 +3680,14 @@
               </a:rPr>
               <a:t>Then, show us the distribution of labels in the selected training and testing samples.</a:t>
             </a:r>
-            <a:endParaRPr lang="en-US" sz="1600" dirty="0"/>
+            <a:endParaRPr lang="en-US" sz="1400" dirty="0"/>
           </a:p>
           <a:p>
             <a:pPr marL="800100" lvl="1" indent="-342900">
               <a:buFont typeface="+mj-lt"/>
               <a:buAutoNum type="alphaLcParenR"/>
             </a:pPr>
-            <a:endParaRPr lang="en-US" sz="1000" dirty="0"/>
+            <a:endParaRPr lang="en-US" sz="900" dirty="0"/>
           </a:p>
           <a:p>
             <a:pPr marL="342900" indent="-342900">
@@ -3690,15 +3695,15 @@
               <a:buAutoNum type="arabicPeriod"/>
             </a:pPr>
             <a:r>
-              <a:rPr lang="en-US" sz="1600" dirty="0"/>
+              <a:rPr lang="en-US" sz="1400" dirty="0"/>
               <a:t>Let's assume that we choose the RBF kernel for SVM. </a:t>
             </a:r>
             <a:r>
-              <a:rPr lang="en-US" sz="1600" i="1" dirty="0"/>
+              <a:rPr lang="en-US" sz="1400" i="1" dirty="0"/>
               <a:t>You may separate your training set for tuning and validation. </a:t>
             </a:r>
             <a:r>
-              <a:rPr lang="en-US" sz="1600" dirty="0"/>
+              <a:rPr lang="en-US" sz="1400" dirty="0"/>
               <a:t> </a:t>
             </a:r>
           </a:p>
@@ -3711,7 +3716,7 @@
               <a:buAutoNum type="alphaLcParenR"/>
             </a:pPr>
             <a:r>
-              <a:rPr lang="en-US" sz="1600" dirty="0"/>
+              <a:rPr lang="en-US" sz="1400" dirty="0"/>
               <a:t>Show the accuracy (or loss ) curves across of the validation set across different kernels and model parameters. </a:t>
             </a:r>
           </a:p>
@@ -3724,13 +3729,13 @@
               <a:buAutoNum type="alphaLcParenR"/>
             </a:pPr>
             <a:r>
-              <a:rPr lang="en-US" sz="1600" dirty="0"/>
+              <a:rPr lang="en-US" sz="1400" dirty="0"/>
               <a:t>Pick the best set of parameters and verify the final performance on the testing dataset.  </a:t>
             </a:r>
           </a:p>
           <a:p>
             <a:pPr lvl="1"/>
-            <a:endParaRPr lang="en-US" sz="1050" dirty="0"/>
+            <a:endParaRPr lang="en-US" sz="1000" dirty="0"/>
           </a:p>
           <a:p>
             <a:pPr marL="342900" indent="-342900">
@@ -3738,7 +3743,7 @@
               <a:buAutoNum type="arabicPeriod"/>
             </a:pPr>
             <a:r>
-              <a:rPr lang="en-US" sz="1600" dirty="0"/>
+              <a:rPr lang="en-US" sz="1400" dirty="0"/>
               <a:t>To see the differences between One-vs-one and One-vs-the rest. Let’s observe the positive and negative samples.  </a:t>
             </a:r>
           </a:p>
@@ -3751,23 +3756,23 @@
               <a:buAutoNum type="alphaLcParenR"/>
             </a:pPr>
             <a:r>
-              <a:rPr lang="en-US" sz="1600" dirty="0"/>
+              <a:rPr lang="en-US" sz="1400" dirty="0"/>
               <a:t>For One-vs-Rest, what is the number of boundary decision </a:t>
             </a:r>
             <a:r>
-              <a:rPr lang="en-US" sz="1600" dirty="0" err="1"/>
+              <a:rPr lang="en-US" sz="1400" dirty="0" err="1"/>
               <a:t>w.r.t.</a:t>
             </a:r>
             <a:r>
-              <a:rPr lang="en-US" sz="1600" dirty="0"/>
+              <a:rPr lang="en-US" sz="1400" dirty="0"/>
               <a:t> the number of classes? What is the number of binary classifiers in </a:t>
             </a:r>
             <a:r>
-              <a:rPr lang="en-US" sz="1600" dirty="0" err="1"/>
+              <a:rPr lang="en-US" sz="1400" dirty="0" err="1"/>
               <a:t>Sklearn</a:t>
             </a:r>
             <a:r>
-              <a:rPr lang="en-US" sz="1600" dirty="0"/>
+              <a:rPr lang="en-US" sz="1400" dirty="0"/>
               <a:t> (RBF kernel)? </a:t>
             </a:r>
           </a:p>
@@ -3780,7 +3785,7 @@
               <a:buChar char="§"/>
             </a:pPr>
             <a:r>
-              <a:rPr lang="en-US" sz="1600" dirty="0"/>
+              <a:rPr lang="en-US" sz="1400" dirty="0"/>
               <a:t>Observe the positive and negative samples of the first and the last separation, and any where in the middle.</a:t>
             </a:r>
           </a:p>
@@ -3793,7 +3798,7 @@
               <a:buAutoNum type="alphaLcParenR"/>
             </a:pPr>
             <a:r>
-              <a:rPr lang="en-US" sz="1600" dirty="0"/>
+              <a:rPr lang="en-US" sz="1400" dirty="0"/>
               <a:t>For One-vs-One, same questions for the number of classifiers and classes. </a:t>
             </a:r>
           </a:p>
@@ -3806,7 +3811,7 @@
               <a:buChar char="§"/>
             </a:pPr>
             <a:r>
-              <a:rPr lang="en-US" sz="1600" dirty="0"/>
+              <a:rPr lang="en-US" sz="1400" dirty="0"/>
               <a:t>Also, give the same observation.</a:t>
             </a:r>
           </a:p>
@@ -3819,12 +3824,12 @@
               <a:buAutoNum type="alphaLcParenR"/>
             </a:pPr>
             <a:r>
-              <a:rPr lang="en-US" sz="1600" dirty="0"/>
+              <a:rPr lang="en-US" sz="1400" dirty="0"/>
               <a:t>Can you tell the differences between the observation in (3.a) and (3.b)? </a:t>
             </a:r>
           </a:p>
           <a:p>
-            <a:pPr marL="800100" lvl="1" indent="-342900">
+            <a:pPr marL="1257300" lvl="2" indent="-342900">
               <a:spcBef>
                 <a:spcPts val="600"/>
               </a:spcBef>
@@ -3832,15 +3837,46 @@
               <a:buChar char="Ø"/>
             </a:pPr>
             <a:r>
-              <a:rPr lang="en-US" sz="1600" dirty="0"/>
+              <a:rPr lang="en-US" sz="1400" dirty="0"/>
               <a:t>For each observation, you may plot the mean shapes of the positive and negative samples &amp; the histogram of </a:t>
             </a:r>
             <a:br>
-              <a:rPr lang="en-US" sz="1600" dirty="0"/>
+              <a:rPr lang="en-US" sz="1400" dirty="0"/>
             </a:br>
             <a:r>
-              <a:rPr lang="en-US" sz="1600" dirty="0"/>
+              <a:rPr lang="en-US" sz="1400" dirty="0"/>
               <a:t>the labels associated with the positive and negative samples.</a:t>
+            </a:r>
+          </a:p>
+          <a:p>
+            <a:pPr marL="800100" lvl="1" indent="-342900">
+              <a:spcBef>
+                <a:spcPts val="600"/>
+              </a:spcBef>
+              <a:buFont typeface="+mj-lt"/>
+              <a:buAutoNum type="alphaLcParenR" startAt="4"/>
+            </a:pPr>
+            <a:r>
+              <a:rPr lang="en-US" sz="1400" dirty="0"/>
+              <a:t>What are the values contained in  </a:t>
+            </a:r>
+            <a:r>
+              <a:rPr lang="en-US" sz="1400" dirty="0" err="1">
+                <a:latin typeface="Courier New" panose="02070309020205020404" pitchFamily="49" charset="0"/>
+                <a:cs typeface="Courier New" panose="02070309020205020404" pitchFamily="49" charset="0"/>
+              </a:rPr>
+              <a:t>svm.dual_coef</a:t>
+            </a:r>
+            <a:r>
+              <a:rPr lang="en-US" sz="1400" dirty="0">
+                <a:latin typeface="Courier New" panose="02070309020205020404" pitchFamily="49" charset="0"/>
+                <a:cs typeface="Courier New" panose="02070309020205020404" pitchFamily="49" charset="0"/>
+              </a:rPr>
+              <a:t>_</a:t>
+            </a:r>
+            <a:r>
+              <a:rPr lang="en-US" sz="1400" dirty="0"/>
+              <a:t> ? Why don't they contain only positive value?</a:t>
             </a:r>
           </a:p>
         </p:txBody>

</xml_diff>